<commit_message>
Change PQO to GPORCA in piv-opt.png graphic (#1886)
</commit_message>
<xml_diff>
--- a/gpdb-doc/dita/graphics/source_files/piv-opt.pptx
+++ b/gpdb-doc/dita/graphics/source_files/piv-opt.pptx
@@ -288,7 +288,7 @@
           <a:p>
             <a:fld id="{67608886-BDD0-4031-A9A9-1BBE47AAFDC1}" type="datetimeFigureOut">
               <a:rPr lang="en-US" smtClean="0"/>
-              <a:t>6/6/2014</a:t>
+              <a:t>2/2/2017</a:t>
             </a:fld>
             <a:endParaRPr lang="en-US"/>
           </a:p>
@@ -458,7 +458,7 @@
           <a:p>
             <a:fld id="{67608886-BDD0-4031-A9A9-1BBE47AAFDC1}" type="datetimeFigureOut">
               <a:rPr lang="en-US" smtClean="0"/>
-              <a:t>6/6/2014</a:t>
+              <a:t>2/2/2017</a:t>
             </a:fld>
             <a:endParaRPr lang="en-US"/>
           </a:p>
@@ -638,7 +638,7 @@
           <a:p>
             <a:fld id="{67608886-BDD0-4031-A9A9-1BBE47AAFDC1}" type="datetimeFigureOut">
               <a:rPr lang="en-US" smtClean="0"/>
-              <a:t>6/6/2014</a:t>
+              <a:t>2/2/2017</a:t>
             </a:fld>
             <a:endParaRPr lang="en-US"/>
           </a:p>
@@ -808,7 +808,7 @@
           <a:p>
             <a:fld id="{67608886-BDD0-4031-A9A9-1BBE47AAFDC1}" type="datetimeFigureOut">
               <a:rPr lang="en-US" smtClean="0"/>
-              <a:t>6/6/2014</a:t>
+              <a:t>2/2/2017</a:t>
             </a:fld>
             <a:endParaRPr lang="en-US"/>
           </a:p>
@@ -1054,7 +1054,7 @@
           <a:p>
             <a:fld id="{67608886-BDD0-4031-A9A9-1BBE47AAFDC1}" type="datetimeFigureOut">
               <a:rPr lang="en-US" smtClean="0"/>
-              <a:t>6/6/2014</a:t>
+              <a:t>2/2/2017</a:t>
             </a:fld>
             <a:endParaRPr lang="en-US"/>
           </a:p>
@@ -1342,7 +1342,7 @@
           <a:p>
             <a:fld id="{67608886-BDD0-4031-A9A9-1BBE47AAFDC1}" type="datetimeFigureOut">
               <a:rPr lang="en-US" smtClean="0"/>
-              <a:t>6/6/2014</a:t>
+              <a:t>2/2/2017</a:t>
             </a:fld>
             <a:endParaRPr lang="en-US"/>
           </a:p>
@@ -1764,7 +1764,7 @@
           <a:p>
             <a:fld id="{67608886-BDD0-4031-A9A9-1BBE47AAFDC1}" type="datetimeFigureOut">
               <a:rPr lang="en-US" smtClean="0"/>
-              <a:t>6/6/2014</a:t>
+              <a:t>2/2/2017</a:t>
             </a:fld>
             <a:endParaRPr lang="en-US"/>
           </a:p>
@@ -1882,7 +1882,7 @@
           <a:p>
             <a:fld id="{67608886-BDD0-4031-A9A9-1BBE47AAFDC1}" type="datetimeFigureOut">
               <a:rPr lang="en-US" smtClean="0"/>
-              <a:t>6/6/2014</a:t>
+              <a:t>2/2/2017</a:t>
             </a:fld>
             <a:endParaRPr lang="en-US"/>
           </a:p>
@@ -1977,7 +1977,7 @@
           <a:p>
             <a:fld id="{67608886-BDD0-4031-A9A9-1BBE47AAFDC1}" type="datetimeFigureOut">
               <a:rPr lang="en-US" smtClean="0"/>
-              <a:t>6/6/2014</a:t>
+              <a:t>2/2/2017</a:t>
             </a:fld>
             <a:endParaRPr lang="en-US"/>
           </a:p>
@@ -2254,7 +2254,7 @@
           <a:p>
             <a:fld id="{67608886-BDD0-4031-A9A9-1BBE47AAFDC1}" type="datetimeFigureOut">
               <a:rPr lang="en-US" smtClean="0"/>
-              <a:t>6/6/2014</a:t>
+              <a:t>2/2/2017</a:t>
             </a:fld>
             <a:endParaRPr lang="en-US"/>
           </a:p>
@@ -2507,7 +2507,7 @@
           <a:p>
             <a:fld id="{67608886-BDD0-4031-A9A9-1BBE47AAFDC1}" type="datetimeFigureOut">
               <a:rPr lang="en-US" smtClean="0"/>
-              <a:t>6/6/2014</a:t>
+              <a:t>2/2/2017</a:t>
             </a:fld>
             <a:endParaRPr lang="en-US"/>
           </a:p>
@@ -2720,7 +2720,7 @@
           <a:p>
             <a:fld id="{67608886-BDD0-4031-A9A9-1BBE47AAFDC1}" type="datetimeFigureOut">
               <a:rPr lang="en-US" smtClean="0"/>
-              <a:t>6/6/2014</a:t>
+              <a:t>2/2/2017</a:t>
             </a:fld>
             <a:endParaRPr lang="en-US"/>
           </a:p>
@@ -3432,8 +3432,8 @@
           </p:nvSpPr>
           <p:spPr>
             <a:xfrm>
-              <a:off x="4114800" y="2378317"/>
-              <a:ext cx="914400" cy="553998"/>
+              <a:off x="4114800" y="2539900"/>
+              <a:ext cx="914400" cy="246221"/>
             </a:xfrm>
             <a:prstGeom prst="rect">
               <a:avLst/>
@@ -3452,7 +3452,7 @@
                   <a:latin typeface="Arial" panose="020B0604020202020204" pitchFamily="34" charset="0"/>
                   <a:cs typeface="Arial" panose="020B0604020202020204" pitchFamily="34" charset="0"/>
                 </a:rPr>
-                <a:t>Pivotal Query Optimizer</a:t>
+                <a:t>GPORCA</a:t>
               </a:r>
               <a:endParaRPr lang="en-US" sz="1000" dirty="0">
                 <a:latin typeface="Arial" panose="020B0604020202020204" pitchFamily="34" charset="0"/>
@@ -3579,14 +3579,7 @@
                   <a:latin typeface="Arial" panose="020B0604020202020204" pitchFamily="34" charset="0"/>
                   <a:cs typeface="Arial" panose="020B0604020202020204" pitchFamily="34" charset="0"/>
                 </a:rPr>
-                <a:t>Legacy </a:t>
-              </a:r>
-              <a:r>
-                <a:rPr lang="en-US" sz="1000" dirty="0" smtClean="0">
-                  <a:latin typeface="Arial" panose="020B0604020202020204" pitchFamily="34" charset="0"/>
-                  <a:cs typeface="Arial" panose="020B0604020202020204" pitchFamily="34" charset="0"/>
-                </a:rPr>
-                <a:t>Optimizer</a:t>
+                <a:t>Legacy Optimizer</a:t>
               </a:r>
               <a:endParaRPr lang="en-US" sz="1000" dirty="0">
                 <a:latin typeface="Arial" panose="020B0604020202020204" pitchFamily="34" charset="0"/>

</xml_diff>

<commit_message>
docs: enhhance gporca overview diagram. (#3600)
</commit_message>
<xml_diff>
--- a/gpdb-doc/dita/graphics/source_files/piv-opt.pptx
+++ b/gpdb-doc/dita/graphics/source_files/piv-opt.pptx
@@ -4,8 +4,12 @@
   <p:sldMasterIdLst>
     <p:sldMasterId id="2147483648" r:id="rId1"/>
   </p:sldMasterIdLst>
+  <p:notesMasterIdLst>
+    <p:notesMasterId r:id="rId4"/>
+  </p:notesMasterIdLst>
   <p:sldIdLst>
-    <p:sldId id="257" r:id="rId2"/>
+    <p:sldId id="258" r:id="rId2"/>
+    <p:sldId id="257" r:id="rId3"/>
   </p:sldIdLst>
   <p:sldSz cx="9144000" cy="6858000" type="screen4x3"/>
   <p:notesSz cx="6858000" cy="9144000"/>
@@ -104,7 +108,557 @@
       </a:defRPr>
     </a:lvl9pPr>
   </p:defaultTextStyle>
+  <p:extLst>
+    <p:ext uri="{EFAFB233-063F-42B5-8137-9DF3F51BA10A}">
+      <p15:sldGuideLst xmlns:p15="http://schemas.microsoft.com/office/powerpoint/2012/main">
+        <p15:guide id="1" orient="horz" pos="2160">
+          <p15:clr>
+            <a:srgbClr val="A4A3A4"/>
+          </p15:clr>
+        </p15:guide>
+        <p15:guide id="2" pos="2880">
+          <p15:clr>
+            <a:srgbClr val="A4A3A4"/>
+          </p15:clr>
+        </p15:guide>
+      </p15:sldGuideLst>
+    </p:ext>
+  </p:extLst>
 </p:presentation>
+</file>
+
+<file path=ppt/notesMasters/notesMaster1.xml><?xml version="1.0" encoding="utf-8"?>
+<p:notesMaster xmlns:a="http://schemas.openxmlformats.org/drawingml/2006/main" xmlns:r="http://schemas.openxmlformats.org/officeDocument/2006/relationships" xmlns:p="http://schemas.openxmlformats.org/presentationml/2006/main">
+  <p:cSld>
+    <p:bg>
+      <p:bgRef idx="1001">
+        <a:schemeClr val="bg1"/>
+      </p:bgRef>
+    </p:bg>
+    <p:spTree>
+      <p:nvGrpSpPr>
+        <p:cNvPr id="1" name=""/>
+        <p:cNvGrpSpPr/>
+        <p:nvPr/>
+      </p:nvGrpSpPr>
+      <p:grpSpPr>
+        <a:xfrm>
+          <a:off x="0" y="0"/>
+          <a:ext cx="0" cy="0"/>
+          <a:chOff x="0" y="0"/>
+          <a:chExt cx="0" cy="0"/>
+        </a:xfrm>
+      </p:grpSpPr>
+      <p:sp>
+        <p:nvSpPr>
+          <p:cNvPr id="2" name="Header Placeholder 1"/>
+          <p:cNvSpPr>
+            <a:spLocks noGrp="1"/>
+          </p:cNvSpPr>
+          <p:nvPr>
+            <p:ph type="hdr" sz="quarter"/>
+          </p:nvPr>
+        </p:nvSpPr>
+        <p:spPr>
+          <a:xfrm>
+            <a:off x="0" y="0"/>
+            <a:ext cx="2971800" cy="458788"/>
+          </a:xfrm>
+          <a:prstGeom prst="rect">
+            <a:avLst/>
+          </a:prstGeom>
+        </p:spPr>
+        <p:txBody>
+          <a:bodyPr vert="horz" lIns="91440" tIns="45720" rIns="91440" bIns="45720" rtlCol="0"/>
+          <a:lstStyle>
+            <a:lvl1pPr algn="l">
+              <a:defRPr sz="1200"/>
+            </a:lvl1pPr>
+          </a:lstStyle>
+          <a:p>
+            <a:endParaRPr lang="en-US"/>
+          </a:p>
+        </p:txBody>
+      </p:sp>
+      <p:sp>
+        <p:nvSpPr>
+          <p:cNvPr id="3" name="Date Placeholder 2"/>
+          <p:cNvSpPr>
+            <a:spLocks noGrp="1"/>
+          </p:cNvSpPr>
+          <p:nvPr>
+            <p:ph type="dt" idx="1"/>
+          </p:nvPr>
+        </p:nvSpPr>
+        <p:spPr>
+          <a:xfrm>
+            <a:off x="3884613" y="0"/>
+            <a:ext cx="2971800" cy="458788"/>
+          </a:xfrm>
+          <a:prstGeom prst="rect">
+            <a:avLst/>
+          </a:prstGeom>
+        </p:spPr>
+        <p:txBody>
+          <a:bodyPr vert="horz" lIns="91440" tIns="45720" rIns="91440" bIns="45720" rtlCol="0"/>
+          <a:lstStyle>
+            <a:lvl1pPr algn="r">
+              <a:defRPr sz="1200"/>
+            </a:lvl1pPr>
+          </a:lstStyle>
+          <a:p>
+            <a:fld id="{2C74E7C1-AE81-CA4D-A5C2-A5CD3248CB83}" type="datetimeFigureOut">
+              <a:rPr lang="en-US" smtClean="0"/>
+              <a:t>10/20/17</a:t>
+            </a:fld>
+            <a:endParaRPr lang="en-US"/>
+          </a:p>
+        </p:txBody>
+      </p:sp>
+      <p:sp>
+        <p:nvSpPr>
+          <p:cNvPr id="4" name="Slide Image Placeholder 3"/>
+          <p:cNvSpPr>
+            <a:spLocks noGrp="1" noRot="1" noChangeAspect="1"/>
+          </p:cNvSpPr>
+          <p:nvPr>
+            <p:ph type="sldImg" idx="2"/>
+          </p:nvPr>
+        </p:nvSpPr>
+        <p:spPr>
+          <a:xfrm>
+            <a:off x="1371600" y="1143000"/>
+            <a:ext cx="4114800" cy="3086100"/>
+          </a:xfrm>
+          <a:prstGeom prst="rect">
+            <a:avLst/>
+          </a:prstGeom>
+          <a:noFill/>
+          <a:ln w="12700">
+            <a:solidFill>
+              <a:prstClr val="black"/>
+            </a:solidFill>
+          </a:ln>
+        </p:spPr>
+        <p:txBody>
+          <a:bodyPr vert="horz" lIns="91440" tIns="45720" rIns="91440" bIns="45720" rtlCol="0" anchor="ctr"/>
+          <a:lstStyle/>
+          <a:p>
+            <a:endParaRPr lang="en-US"/>
+          </a:p>
+        </p:txBody>
+      </p:sp>
+      <p:sp>
+        <p:nvSpPr>
+          <p:cNvPr id="5" name="Notes Placeholder 4"/>
+          <p:cNvSpPr>
+            <a:spLocks noGrp="1"/>
+          </p:cNvSpPr>
+          <p:nvPr>
+            <p:ph type="body" sz="quarter" idx="3"/>
+          </p:nvPr>
+        </p:nvSpPr>
+        <p:spPr>
+          <a:xfrm>
+            <a:off x="685800" y="4400550"/>
+            <a:ext cx="5486400" cy="3600450"/>
+          </a:xfrm>
+          <a:prstGeom prst="rect">
+            <a:avLst/>
+          </a:prstGeom>
+        </p:spPr>
+        <p:txBody>
+          <a:bodyPr vert="horz" lIns="91440" tIns="45720" rIns="91440" bIns="45720" rtlCol="0"/>
+          <a:lstStyle/>
+          <a:p>
+            <a:pPr lvl="0"/>
+            <a:r>
+              <a:rPr lang="en-US" smtClean="0"/>
+              <a:t>Click to edit Master text styles</a:t>
+            </a:r>
+          </a:p>
+          <a:p>
+            <a:pPr lvl="1"/>
+            <a:r>
+              <a:rPr lang="en-US" smtClean="0"/>
+              <a:t>Second level</a:t>
+            </a:r>
+          </a:p>
+          <a:p>
+            <a:pPr lvl="2"/>
+            <a:r>
+              <a:rPr lang="en-US" smtClean="0"/>
+              <a:t>Third level</a:t>
+            </a:r>
+          </a:p>
+          <a:p>
+            <a:pPr lvl="3"/>
+            <a:r>
+              <a:rPr lang="en-US" smtClean="0"/>
+              <a:t>Fourth level</a:t>
+            </a:r>
+          </a:p>
+          <a:p>
+            <a:pPr lvl="4"/>
+            <a:r>
+              <a:rPr lang="en-US" smtClean="0"/>
+              <a:t>Fifth level</a:t>
+            </a:r>
+            <a:endParaRPr lang="en-US"/>
+          </a:p>
+        </p:txBody>
+      </p:sp>
+      <p:sp>
+        <p:nvSpPr>
+          <p:cNvPr id="6" name="Footer Placeholder 5"/>
+          <p:cNvSpPr>
+            <a:spLocks noGrp="1"/>
+          </p:cNvSpPr>
+          <p:nvPr>
+            <p:ph type="ftr" sz="quarter" idx="4"/>
+          </p:nvPr>
+        </p:nvSpPr>
+        <p:spPr>
+          <a:xfrm>
+            <a:off x="0" y="8685213"/>
+            <a:ext cx="2971800" cy="458787"/>
+          </a:xfrm>
+          <a:prstGeom prst="rect">
+            <a:avLst/>
+          </a:prstGeom>
+        </p:spPr>
+        <p:txBody>
+          <a:bodyPr vert="horz" lIns="91440" tIns="45720" rIns="91440" bIns="45720" rtlCol="0" anchor="b"/>
+          <a:lstStyle>
+            <a:lvl1pPr algn="l">
+              <a:defRPr sz="1200"/>
+            </a:lvl1pPr>
+          </a:lstStyle>
+          <a:p>
+            <a:endParaRPr lang="en-US"/>
+          </a:p>
+        </p:txBody>
+      </p:sp>
+      <p:sp>
+        <p:nvSpPr>
+          <p:cNvPr id="7" name="Slide Number Placeholder 6"/>
+          <p:cNvSpPr>
+            <a:spLocks noGrp="1"/>
+          </p:cNvSpPr>
+          <p:nvPr>
+            <p:ph type="sldNum" sz="quarter" idx="5"/>
+          </p:nvPr>
+        </p:nvSpPr>
+        <p:spPr>
+          <a:xfrm>
+            <a:off x="3884613" y="8685213"/>
+            <a:ext cx="2971800" cy="458787"/>
+          </a:xfrm>
+          <a:prstGeom prst="rect">
+            <a:avLst/>
+          </a:prstGeom>
+        </p:spPr>
+        <p:txBody>
+          <a:bodyPr vert="horz" lIns="91440" tIns="45720" rIns="91440" bIns="45720" rtlCol="0" anchor="b"/>
+          <a:lstStyle>
+            <a:lvl1pPr algn="r">
+              <a:defRPr sz="1200"/>
+            </a:lvl1pPr>
+          </a:lstStyle>
+          <a:p>
+            <a:fld id="{DD010ACC-7817-8441-AB9B-CA92452C32E0}" type="slidenum">
+              <a:rPr lang="en-US" smtClean="0"/>
+              <a:t>‹#›</a:t>
+            </a:fld>
+            <a:endParaRPr lang="en-US"/>
+          </a:p>
+        </p:txBody>
+      </p:sp>
+    </p:spTree>
+    <p:extLst>
+      <p:ext uri="{BB962C8B-B14F-4D97-AF65-F5344CB8AC3E}">
+        <p14:creationId xmlns:p14="http://schemas.microsoft.com/office/powerpoint/2010/main" val="2264450"/>
+      </p:ext>
+    </p:extLst>
+  </p:cSld>
+  <p:clrMap bg1="lt1" tx1="dk1" bg2="lt2" tx2="dk2" accent1="accent1" accent2="accent2" accent3="accent3" accent4="accent4" accent5="accent5" accent6="accent6" hlink="hlink" folHlink="folHlink"/>
+  <p:notesStyle>
+    <a:lvl1pPr marL="0" algn="l" defTabSz="914400" rtl="0" eaLnBrk="1" latinLnBrk="0" hangingPunct="1">
+      <a:defRPr sz="1200" kern="1200">
+        <a:solidFill>
+          <a:schemeClr val="tx1"/>
+        </a:solidFill>
+        <a:latin typeface="+mn-lt"/>
+        <a:ea typeface="+mn-ea"/>
+        <a:cs typeface="+mn-cs"/>
+      </a:defRPr>
+    </a:lvl1pPr>
+    <a:lvl2pPr marL="457200" algn="l" defTabSz="914400" rtl="0" eaLnBrk="1" latinLnBrk="0" hangingPunct="1">
+      <a:defRPr sz="1200" kern="1200">
+        <a:solidFill>
+          <a:schemeClr val="tx1"/>
+        </a:solidFill>
+        <a:latin typeface="+mn-lt"/>
+        <a:ea typeface="+mn-ea"/>
+        <a:cs typeface="+mn-cs"/>
+      </a:defRPr>
+    </a:lvl2pPr>
+    <a:lvl3pPr marL="914400" algn="l" defTabSz="914400" rtl="0" eaLnBrk="1" latinLnBrk="0" hangingPunct="1">
+      <a:defRPr sz="1200" kern="1200">
+        <a:solidFill>
+          <a:schemeClr val="tx1"/>
+        </a:solidFill>
+        <a:latin typeface="+mn-lt"/>
+        <a:ea typeface="+mn-ea"/>
+        <a:cs typeface="+mn-cs"/>
+      </a:defRPr>
+    </a:lvl3pPr>
+    <a:lvl4pPr marL="1371600" algn="l" defTabSz="914400" rtl="0" eaLnBrk="1" latinLnBrk="0" hangingPunct="1">
+      <a:defRPr sz="1200" kern="1200">
+        <a:solidFill>
+          <a:schemeClr val="tx1"/>
+        </a:solidFill>
+        <a:latin typeface="+mn-lt"/>
+        <a:ea typeface="+mn-ea"/>
+        <a:cs typeface="+mn-cs"/>
+      </a:defRPr>
+    </a:lvl4pPr>
+    <a:lvl5pPr marL="1828800" algn="l" defTabSz="914400" rtl="0" eaLnBrk="1" latinLnBrk="0" hangingPunct="1">
+      <a:defRPr sz="1200" kern="1200">
+        <a:solidFill>
+          <a:schemeClr val="tx1"/>
+        </a:solidFill>
+        <a:latin typeface="+mn-lt"/>
+        <a:ea typeface="+mn-ea"/>
+        <a:cs typeface="+mn-cs"/>
+      </a:defRPr>
+    </a:lvl5pPr>
+    <a:lvl6pPr marL="2286000" algn="l" defTabSz="914400" rtl="0" eaLnBrk="1" latinLnBrk="0" hangingPunct="1">
+      <a:defRPr sz="1200" kern="1200">
+        <a:solidFill>
+          <a:schemeClr val="tx1"/>
+        </a:solidFill>
+        <a:latin typeface="+mn-lt"/>
+        <a:ea typeface="+mn-ea"/>
+        <a:cs typeface="+mn-cs"/>
+      </a:defRPr>
+    </a:lvl6pPr>
+    <a:lvl7pPr marL="2743200" algn="l" defTabSz="914400" rtl="0" eaLnBrk="1" latinLnBrk="0" hangingPunct="1">
+      <a:defRPr sz="1200" kern="1200">
+        <a:solidFill>
+          <a:schemeClr val="tx1"/>
+        </a:solidFill>
+        <a:latin typeface="+mn-lt"/>
+        <a:ea typeface="+mn-ea"/>
+        <a:cs typeface="+mn-cs"/>
+      </a:defRPr>
+    </a:lvl7pPr>
+    <a:lvl8pPr marL="3200400" algn="l" defTabSz="914400" rtl="0" eaLnBrk="1" latinLnBrk="0" hangingPunct="1">
+      <a:defRPr sz="1200" kern="1200">
+        <a:solidFill>
+          <a:schemeClr val="tx1"/>
+        </a:solidFill>
+        <a:latin typeface="+mn-lt"/>
+        <a:ea typeface="+mn-ea"/>
+        <a:cs typeface="+mn-cs"/>
+      </a:defRPr>
+    </a:lvl8pPr>
+    <a:lvl9pPr marL="3657600" algn="l" defTabSz="914400" rtl="0" eaLnBrk="1" latinLnBrk="0" hangingPunct="1">
+      <a:defRPr sz="1200" kern="1200">
+        <a:solidFill>
+          <a:schemeClr val="tx1"/>
+        </a:solidFill>
+        <a:latin typeface="+mn-lt"/>
+        <a:ea typeface="+mn-ea"/>
+        <a:cs typeface="+mn-cs"/>
+      </a:defRPr>
+    </a:lvl9pPr>
+  </p:notesStyle>
+</p:notesMaster>
+</file>
+
+<file path=ppt/notesSlides/notesSlide1.xml><?xml version="1.0" encoding="utf-8"?>
+<p:notes xmlns:a="http://schemas.openxmlformats.org/drawingml/2006/main" xmlns:r="http://schemas.openxmlformats.org/officeDocument/2006/relationships" xmlns:p="http://schemas.openxmlformats.org/presentationml/2006/main">
+  <p:cSld>
+    <p:spTree>
+      <p:nvGrpSpPr>
+        <p:cNvPr id="1" name=""/>
+        <p:cNvGrpSpPr/>
+        <p:nvPr/>
+      </p:nvGrpSpPr>
+      <p:grpSpPr>
+        <a:xfrm>
+          <a:off x="0" y="0"/>
+          <a:ext cx="0" cy="0"/>
+          <a:chOff x="0" y="0"/>
+          <a:chExt cx="0" cy="0"/>
+        </a:xfrm>
+      </p:grpSpPr>
+      <p:sp>
+        <p:nvSpPr>
+          <p:cNvPr id="2" name="Slide Image Placeholder 1"/>
+          <p:cNvSpPr>
+            <a:spLocks noGrp="1" noRot="1" noChangeAspect="1"/>
+          </p:cNvSpPr>
+          <p:nvPr>
+            <p:ph type="sldImg"/>
+          </p:nvPr>
+        </p:nvSpPr>
+        <p:spPr/>
+      </p:sp>
+      <p:sp>
+        <p:nvSpPr>
+          <p:cNvPr id="3" name="Notes Placeholder 2"/>
+          <p:cNvSpPr>
+            <a:spLocks noGrp="1"/>
+          </p:cNvSpPr>
+          <p:nvPr>
+            <p:ph type="body" idx="1"/>
+          </p:nvPr>
+        </p:nvSpPr>
+        <p:spPr/>
+        <p:txBody>
+          <a:bodyPr/>
+          <a:lstStyle/>
+          <a:p>
+            <a:r>
+              <a:rPr lang="en-US" smtClean="0"/>
+              <a:t>New</a:t>
+            </a:r>
+            <a:r>
+              <a:rPr lang="en-US" baseline="0" smtClean="0"/>
+              <a:t> </a:t>
+            </a:r>
+            <a:r>
+              <a:rPr lang="en-US" baseline="0" smtClean="0"/>
+              <a:t>image export 920 x 690</a:t>
+            </a:r>
+            <a:endParaRPr lang="en-US" dirty="0"/>
+          </a:p>
+        </p:txBody>
+      </p:sp>
+      <p:sp>
+        <p:nvSpPr>
+          <p:cNvPr id="4" name="Slide Number Placeholder 3"/>
+          <p:cNvSpPr>
+            <a:spLocks noGrp="1"/>
+          </p:cNvSpPr>
+          <p:nvPr>
+            <p:ph type="sldNum" sz="quarter" idx="10"/>
+          </p:nvPr>
+        </p:nvSpPr>
+        <p:spPr/>
+        <p:txBody>
+          <a:bodyPr/>
+          <a:lstStyle/>
+          <a:p>
+            <a:fld id="{DD010ACC-7817-8441-AB9B-CA92452C32E0}" type="slidenum">
+              <a:rPr lang="en-US" smtClean="0"/>
+              <a:t>1</a:t>
+            </a:fld>
+            <a:endParaRPr lang="en-US"/>
+          </a:p>
+        </p:txBody>
+      </p:sp>
+    </p:spTree>
+    <p:extLst>
+      <p:ext uri="{BB962C8B-B14F-4D97-AF65-F5344CB8AC3E}">
+        <p14:creationId xmlns:p14="http://schemas.microsoft.com/office/powerpoint/2010/main" val="1551389151"/>
+      </p:ext>
+    </p:extLst>
+  </p:cSld>
+  <p:clrMapOvr>
+    <a:masterClrMapping/>
+  </p:clrMapOvr>
+</p:notes>
+</file>
+
+<file path=ppt/notesSlides/notesSlide2.xml><?xml version="1.0" encoding="utf-8"?>
+<p:notes xmlns:a="http://schemas.openxmlformats.org/drawingml/2006/main" xmlns:r="http://schemas.openxmlformats.org/officeDocument/2006/relationships" xmlns:p="http://schemas.openxmlformats.org/presentationml/2006/main">
+  <p:cSld>
+    <p:spTree>
+      <p:nvGrpSpPr>
+        <p:cNvPr id="1" name=""/>
+        <p:cNvGrpSpPr/>
+        <p:nvPr/>
+      </p:nvGrpSpPr>
+      <p:grpSpPr>
+        <a:xfrm>
+          <a:off x="0" y="0"/>
+          <a:ext cx="0" cy="0"/>
+          <a:chOff x="0" y="0"/>
+          <a:chExt cx="0" cy="0"/>
+        </a:xfrm>
+      </p:grpSpPr>
+      <p:sp>
+        <p:nvSpPr>
+          <p:cNvPr id="2" name="Slide Image Placeholder 1"/>
+          <p:cNvSpPr>
+            <a:spLocks noGrp="1" noRot="1" noChangeAspect="1"/>
+          </p:cNvSpPr>
+          <p:nvPr>
+            <p:ph type="sldImg"/>
+          </p:nvPr>
+        </p:nvSpPr>
+        <p:spPr/>
+      </p:sp>
+      <p:sp>
+        <p:nvSpPr>
+          <p:cNvPr id="3" name="Notes Placeholder 2"/>
+          <p:cNvSpPr>
+            <a:spLocks noGrp="1"/>
+          </p:cNvSpPr>
+          <p:nvPr>
+            <p:ph type="body" idx="1"/>
+          </p:nvPr>
+        </p:nvSpPr>
+        <p:spPr/>
+        <p:txBody>
+          <a:bodyPr/>
+          <a:lstStyle/>
+          <a:p>
+            <a:r>
+              <a:rPr lang="en-US" dirty="0" smtClean="0"/>
+              <a:t>Old image</a:t>
+            </a:r>
+            <a:endParaRPr lang="en-US" dirty="0"/>
+          </a:p>
+        </p:txBody>
+      </p:sp>
+      <p:sp>
+        <p:nvSpPr>
+          <p:cNvPr id="4" name="Slide Number Placeholder 3"/>
+          <p:cNvSpPr>
+            <a:spLocks noGrp="1"/>
+          </p:cNvSpPr>
+          <p:nvPr>
+            <p:ph type="sldNum" sz="quarter" idx="10"/>
+          </p:nvPr>
+        </p:nvSpPr>
+        <p:spPr/>
+        <p:txBody>
+          <a:bodyPr/>
+          <a:lstStyle/>
+          <a:p>
+            <a:fld id="{DD010ACC-7817-8441-AB9B-CA92452C32E0}" type="slidenum">
+              <a:rPr lang="en-US" smtClean="0"/>
+              <a:t>2</a:t>
+            </a:fld>
+            <a:endParaRPr lang="en-US"/>
+          </a:p>
+        </p:txBody>
+      </p:sp>
+    </p:spTree>
+    <p:extLst>
+      <p:ext uri="{BB962C8B-B14F-4D97-AF65-F5344CB8AC3E}">
+        <p14:creationId xmlns:p14="http://schemas.microsoft.com/office/powerpoint/2010/main" val="478402902"/>
+      </p:ext>
+    </p:extLst>
+  </p:cSld>
+  <p:clrMapOvr>
+    <a:masterClrMapping/>
+  </p:clrMapOvr>
+</p:notes>
 </file>
 
 <file path=ppt/slideLayouts/slideLayout1.xml><?xml version="1.0" encoding="utf-8"?>
@@ -288,7 +842,7 @@
           <a:p>
             <a:fld id="{67608886-BDD0-4031-A9A9-1BBE47AAFDC1}" type="datetimeFigureOut">
               <a:rPr lang="en-US" smtClean="0"/>
-              <a:t>2/2/2017</a:t>
+              <a:t>10/20/17</a:t>
             </a:fld>
             <a:endParaRPr lang="en-US"/>
           </a:p>
@@ -458,7 +1012,7 @@
           <a:p>
             <a:fld id="{67608886-BDD0-4031-A9A9-1BBE47AAFDC1}" type="datetimeFigureOut">
               <a:rPr lang="en-US" smtClean="0"/>
-              <a:t>2/2/2017</a:t>
+              <a:t>10/20/17</a:t>
             </a:fld>
             <a:endParaRPr lang="en-US"/>
           </a:p>
@@ -638,7 +1192,7 @@
           <a:p>
             <a:fld id="{67608886-BDD0-4031-A9A9-1BBE47AAFDC1}" type="datetimeFigureOut">
               <a:rPr lang="en-US" smtClean="0"/>
-              <a:t>2/2/2017</a:t>
+              <a:t>10/20/17</a:t>
             </a:fld>
             <a:endParaRPr lang="en-US"/>
           </a:p>
@@ -808,7 +1362,7 @@
           <a:p>
             <a:fld id="{67608886-BDD0-4031-A9A9-1BBE47AAFDC1}" type="datetimeFigureOut">
               <a:rPr lang="en-US" smtClean="0"/>
-              <a:t>2/2/2017</a:t>
+              <a:t>10/20/17</a:t>
             </a:fld>
             <a:endParaRPr lang="en-US"/>
           </a:p>
@@ -1054,7 +1608,7 @@
           <a:p>
             <a:fld id="{67608886-BDD0-4031-A9A9-1BBE47AAFDC1}" type="datetimeFigureOut">
               <a:rPr lang="en-US" smtClean="0"/>
-              <a:t>2/2/2017</a:t>
+              <a:t>10/20/17</a:t>
             </a:fld>
             <a:endParaRPr lang="en-US"/>
           </a:p>
@@ -1342,7 +1896,7 @@
           <a:p>
             <a:fld id="{67608886-BDD0-4031-A9A9-1BBE47AAFDC1}" type="datetimeFigureOut">
               <a:rPr lang="en-US" smtClean="0"/>
-              <a:t>2/2/2017</a:t>
+              <a:t>10/20/17</a:t>
             </a:fld>
             <a:endParaRPr lang="en-US"/>
           </a:p>
@@ -1764,7 +2318,7 @@
           <a:p>
             <a:fld id="{67608886-BDD0-4031-A9A9-1BBE47AAFDC1}" type="datetimeFigureOut">
               <a:rPr lang="en-US" smtClean="0"/>
-              <a:t>2/2/2017</a:t>
+              <a:t>10/20/17</a:t>
             </a:fld>
             <a:endParaRPr lang="en-US"/>
           </a:p>
@@ -1882,7 +2436,7 @@
           <a:p>
             <a:fld id="{67608886-BDD0-4031-A9A9-1BBE47AAFDC1}" type="datetimeFigureOut">
               <a:rPr lang="en-US" smtClean="0"/>
-              <a:t>2/2/2017</a:t>
+              <a:t>10/20/17</a:t>
             </a:fld>
             <a:endParaRPr lang="en-US"/>
           </a:p>
@@ -1977,7 +2531,7 @@
           <a:p>
             <a:fld id="{67608886-BDD0-4031-A9A9-1BBE47AAFDC1}" type="datetimeFigureOut">
               <a:rPr lang="en-US" smtClean="0"/>
-              <a:t>2/2/2017</a:t>
+              <a:t>10/20/17</a:t>
             </a:fld>
             <a:endParaRPr lang="en-US"/>
           </a:p>
@@ -2254,7 +2808,7 @@
           <a:p>
             <a:fld id="{67608886-BDD0-4031-A9A9-1BBE47AAFDC1}" type="datetimeFigureOut">
               <a:rPr lang="en-US" smtClean="0"/>
-              <a:t>2/2/2017</a:t>
+              <a:t>10/20/17</a:t>
             </a:fld>
             <a:endParaRPr lang="en-US"/>
           </a:p>
@@ -2507,7 +3061,7 @@
           <a:p>
             <a:fld id="{67608886-BDD0-4031-A9A9-1BBE47AAFDC1}" type="datetimeFigureOut">
               <a:rPr lang="en-US" smtClean="0"/>
-              <a:t>2/2/2017</a:t>
+              <a:t>10/20/17</a:t>
             </a:fld>
             <a:endParaRPr lang="en-US"/>
           </a:p>
@@ -2720,7 +3274,7 @@
           <a:p>
             <a:fld id="{67608886-BDD0-4031-A9A9-1BBE47AAFDC1}" type="datetimeFigureOut">
               <a:rPr lang="en-US" smtClean="0"/>
-              <a:t>2/2/2017</a:t>
+              <a:t>10/20/17</a:t>
             </a:fld>
             <a:endParaRPr lang="en-US"/>
           </a:p>
@@ -3079,6 +3633,1078 @@
 </file>
 
 <file path=ppt/slides/slide1.xml><?xml version="1.0" encoding="utf-8"?>
+<p:sld xmlns:a="http://schemas.openxmlformats.org/drawingml/2006/main" xmlns:r="http://schemas.openxmlformats.org/officeDocument/2006/relationships" xmlns:p="http://schemas.openxmlformats.org/presentationml/2006/main">
+  <p:cSld>
+    <p:spTree>
+      <p:nvGrpSpPr>
+        <p:cNvPr id="1" name=""/>
+        <p:cNvGrpSpPr/>
+        <p:nvPr/>
+      </p:nvGrpSpPr>
+      <p:grpSpPr>
+        <a:xfrm>
+          <a:off x="0" y="0"/>
+          <a:ext cx="0" cy="0"/>
+          <a:chOff x="0" y="0"/>
+          <a:chExt cx="0" cy="0"/>
+        </a:xfrm>
+      </p:grpSpPr>
+      <p:cxnSp>
+        <p:nvCxnSpPr>
+          <p:cNvPr id="9" name="Straight Arrow Connector 8"/>
+          <p:cNvCxnSpPr/>
+          <p:nvPr/>
+        </p:nvCxnSpPr>
+        <p:spPr>
+          <a:xfrm>
+            <a:off x="2795748" y="2963332"/>
+            <a:ext cx="454955" cy="4876"/>
+          </a:xfrm>
+          <a:prstGeom prst="straightConnector1">
+            <a:avLst/>
+          </a:prstGeom>
+          <a:ln>
+            <a:solidFill>
+              <a:schemeClr val="tx1"/>
+            </a:solidFill>
+            <a:tailEnd type="triangle"/>
+          </a:ln>
+        </p:spPr>
+        <p:style>
+          <a:lnRef idx="1">
+            <a:schemeClr val="accent1"/>
+          </a:lnRef>
+          <a:fillRef idx="0">
+            <a:schemeClr val="accent1"/>
+          </a:fillRef>
+          <a:effectRef idx="0">
+            <a:schemeClr val="accent1"/>
+          </a:effectRef>
+          <a:fontRef idx="minor">
+            <a:schemeClr val="tx1"/>
+          </a:fontRef>
+        </p:style>
+      </p:cxnSp>
+      <p:cxnSp>
+        <p:nvCxnSpPr>
+          <p:cNvPr id="14" name="Straight Arrow Connector 13"/>
+          <p:cNvCxnSpPr/>
+          <p:nvPr/>
+        </p:nvCxnSpPr>
+        <p:spPr>
+          <a:xfrm>
+            <a:off x="4904537" y="2971799"/>
+            <a:ext cx="1584947" cy="9754"/>
+          </a:xfrm>
+          <a:prstGeom prst="straightConnector1">
+            <a:avLst/>
+          </a:prstGeom>
+          <a:ln>
+            <a:solidFill>
+              <a:schemeClr val="tx1"/>
+            </a:solidFill>
+            <a:tailEnd type="triangle"/>
+          </a:ln>
+        </p:spPr>
+        <p:style>
+          <a:lnRef idx="1">
+            <a:schemeClr val="accent1"/>
+          </a:lnRef>
+          <a:fillRef idx="0">
+            <a:schemeClr val="accent1"/>
+          </a:fillRef>
+          <a:effectRef idx="0">
+            <a:schemeClr val="accent1"/>
+          </a:effectRef>
+          <a:fontRef idx="minor">
+            <a:schemeClr val="tx1"/>
+          </a:fontRef>
+        </p:style>
+      </p:cxnSp>
+      <p:cxnSp>
+        <p:nvCxnSpPr>
+          <p:cNvPr id="20" name="Elbow Connector 19"/>
+          <p:cNvCxnSpPr/>
+          <p:nvPr/>
+        </p:nvCxnSpPr>
+        <p:spPr>
+          <a:xfrm>
+            <a:off x="3252948" y="2981554"/>
+            <a:ext cx="1086999" cy="788339"/>
+          </a:xfrm>
+          <a:prstGeom prst="bentConnector3">
+            <a:avLst>
+              <a:gd name="adj1" fmla="val 150"/>
+            </a:avLst>
+          </a:prstGeom>
+          <a:ln>
+            <a:solidFill>
+              <a:schemeClr val="tx1"/>
+            </a:solidFill>
+            <a:tailEnd type="triangle"/>
+          </a:ln>
+        </p:spPr>
+        <p:style>
+          <a:lnRef idx="1">
+            <a:schemeClr val="accent1"/>
+          </a:lnRef>
+          <a:fillRef idx="0">
+            <a:schemeClr val="accent1"/>
+          </a:fillRef>
+          <a:effectRef idx="0">
+            <a:schemeClr val="accent1"/>
+          </a:effectRef>
+          <a:fontRef idx="minor">
+            <a:schemeClr val="tx1"/>
+          </a:fontRef>
+        </p:style>
+      </p:cxnSp>
+      <p:sp>
+        <p:nvSpPr>
+          <p:cNvPr id="25" name="TextBox 24"/>
+          <p:cNvSpPr txBox="1"/>
+          <p:nvPr/>
+        </p:nvSpPr>
+        <p:spPr>
+          <a:xfrm>
+            <a:off x="1337063" y="2477989"/>
+            <a:ext cx="768178" cy="400110"/>
+          </a:xfrm>
+          <a:prstGeom prst="rect">
+            <a:avLst/>
+          </a:prstGeom>
+          <a:noFill/>
+        </p:spPr>
+        <p:txBody>
+          <a:bodyPr wrap="square" rtlCol="0">
+            <a:spAutoFit/>
+          </a:bodyPr>
+          <a:lstStyle/>
+          <a:p>
+            <a:pPr algn="ctr"/>
+            <a:r>
+              <a:rPr lang="en-US" sz="1000" dirty="0" smtClean="0">
+                <a:latin typeface="Arial" panose="020B0604020202020204" pitchFamily="34" charset="0"/>
+                <a:cs typeface="Arial" panose="020B0604020202020204" pitchFamily="34" charset="0"/>
+              </a:rPr>
+              <a:t>Client </a:t>
+            </a:r>
+            <a:br>
+              <a:rPr lang="en-US" sz="1000" dirty="0" smtClean="0">
+                <a:latin typeface="Arial" panose="020B0604020202020204" pitchFamily="34" charset="0"/>
+                <a:cs typeface="Arial" panose="020B0604020202020204" pitchFamily="34" charset="0"/>
+              </a:rPr>
+            </a:br>
+            <a:r>
+              <a:rPr lang="en-US" sz="1000" dirty="0" smtClean="0">
+                <a:latin typeface="Arial" panose="020B0604020202020204" pitchFamily="34" charset="0"/>
+                <a:cs typeface="Arial" panose="020B0604020202020204" pitchFamily="34" charset="0"/>
+              </a:rPr>
+              <a:t>Query</a:t>
+            </a:r>
+            <a:endParaRPr lang="en-US" sz="1000" dirty="0">
+              <a:latin typeface="Arial" panose="020B0604020202020204" pitchFamily="34" charset="0"/>
+              <a:cs typeface="Arial" panose="020B0604020202020204" pitchFamily="34" charset="0"/>
+            </a:endParaRPr>
+          </a:p>
+        </p:txBody>
+      </p:sp>
+      <p:grpSp>
+        <p:nvGrpSpPr>
+          <p:cNvPr id="46" name="Group 45"/>
+          <p:cNvGrpSpPr/>
+          <p:nvPr/>
+        </p:nvGrpSpPr>
+        <p:grpSpPr>
+          <a:xfrm>
+            <a:off x="2009852" y="2777214"/>
+            <a:ext cx="773855" cy="364867"/>
+            <a:chOff x="2316145" y="2255884"/>
+            <a:chExt cx="916075" cy="364867"/>
+          </a:xfrm>
+        </p:grpSpPr>
+        <p:sp>
+          <p:nvSpPr>
+            <p:cNvPr id="4" name="Rounded Rectangle 3"/>
+            <p:cNvSpPr/>
+            <p:nvPr/>
+          </p:nvSpPr>
+          <p:spPr>
+            <a:xfrm>
+              <a:off x="2317820" y="2255884"/>
+              <a:ext cx="914400" cy="364867"/>
+            </a:xfrm>
+            <a:prstGeom prst="roundRect">
+              <a:avLst/>
+            </a:prstGeom>
+            <a:noFill/>
+            <a:ln w="19050">
+              <a:solidFill>
+                <a:schemeClr val="tx1"/>
+              </a:solidFill>
+            </a:ln>
+          </p:spPr>
+          <p:style>
+            <a:lnRef idx="2">
+              <a:schemeClr val="accent1">
+                <a:shade val="50000"/>
+              </a:schemeClr>
+            </a:lnRef>
+            <a:fillRef idx="1">
+              <a:schemeClr val="accent1"/>
+            </a:fillRef>
+            <a:effectRef idx="0">
+              <a:schemeClr val="accent1"/>
+            </a:effectRef>
+            <a:fontRef idx="minor">
+              <a:schemeClr val="lt1"/>
+            </a:fontRef>
+          </p:style>
+          <p:txBody>
+            <a:bodyPr rtlCol="0" anchor="ctr"/>
+            <a:lstStyle/>
+            <a:p>
+              <a:pPr algn="ctr"/>
+              <a:endParaRPr lang="en-US" sz="1000"/>
+            </a:p>
+          </p:txBody>
+        </p:sp>
+        <p:sp>
+          <p:nvSpPr>
+            <p:cNvPr id="28" name="TextBox 27"/>
+            <p:cNvSpPr txBox="1"/>
+            <p:nvPr/>
+          </p:nvSpPr>
+          <p:spPr>
+            <a:xfrm>
+              <a:off x="2316145" y="2307512"/>
+              <a:ext cx="914400" cy="246221"/>
+            </a:xfrm>
+            <a:prstGeom prst="rect">
+              <a:avLst/>
+            </a:prstGeom>
+            <a:noFill/>
+          </p:spPr>
+          <p:txBody>
+            <a:bodyPr wrap="square" rtlCol="0">
+              <a:spAutoFit/>
+            </a:bodyPr>
+            <a:lstStyle/>
+            <a:p>
+              <a:pPr algn="ctr"/>
+              <a:r>
+                <a:rPr lang="en-US" sz="1000" dirty="0" smtClean="0">
+                  <a:latin typeface="Arial" panose="020B0604020202020204" pitchFamily="34" charset="0"/>
+                  <a:cs typeface="Arial" panose="020B0604020202020204" pitchFamily="34" charset="0"/>
+                </a:rPr>
+                <a:t>Parser</a:t>
+              </a:r>
+              <a:endParaRPr lang="en-US" sz="1000" dirty="0">
+                <a:latin typeface="Arial" panose="020B0604020202020204" pitchFamily="34" charset="0"/>
+                <a:cs typeface="Arial" panose="020B0604020202020204" pitchFamily="34" charset="0"/>
+              </a:endParaRPr>
+            </a:p>
+          </p:txBody>
+        </p:sp>
+      </p:grpSp>
+      <p:grpSp>
+        <p:nvGrpSpPr>
+          <p:cNvPr id="71" name="Group 70"/>
+          <p:cNvGrpSpPr/>
+          <p:nvPr/>
+        </p:nvGrpSpPr>
+        <p:grpSpPr>
+          <a:xfrm>
+            <a:off x="4342102" y="1939526"/>
+            <a:ext cx="914400" cy="690340"/>
+            <a:chOff x="4114800" y="2333229"/>
+            <a:chExt cx="914400" cy="690340"/>
+          </a:xfrm>
+        </p:grpSpPr>
+        <p:sp>
+          <p:nvSpPr>
+            <p:cNvPr id="6" name="Rounded Rectangle 5"/>
+            <p:cNvSpPr/>
+            <p:nvPr/>
+          </p:nvSpPr>
+          <p:spPr>
+            <a:xfrm>
+              <a:off x="4114800" y="2333229"/>
+              <a:ext cx="914400" cy="690340"/>
+            </a:xfrm>
+            <a:prstGeom prst="roundRect">
+              <a:avLst/>
+            </a:prstGeom>
+            <a:solidFill>
+              <a:schemeClr val="bg1">
+                <a:lumMod val="85000"/>
+              </a:schemeClr>
+            </a:solidFill>
+            <a:ln w="19050">
+              <a:solidFill>
+                <a:schemeClr val="tx1"/>
+              </a:solidFill>
+            </a:ln>
+          </p:spPr>
+          <p:style>
+            <a:lnRef idx="2">
+              <a:schemeClr val="accent1">
+                <a:shade val="50000"/>
+              </a:schemeClr>
+            </a:lnRef>
+            <a:fillRef idx="1">
+              <a:schemeClr val="accent1"/>
+            </a:fillRef>
+            <a:effectRef idx="0">
+              <a:schemeClr val="accent1"/>
+            </a:effectRef>
+            <a:fontRef idx="minor">
+              <a:schemeClr val="lt1"/>
+            </a:fontRef>
+          </p:style>
+          <p:txBody>
+            <a:bodyPr rtlCol="0" anchor="ctr"/>
+            <a:lstStyle/>
+            <a:p>
+              <a:pPr algn="ctr"/>
+              <a:endParaRPr lang="en-US" sz="1000"/>
+            </a:p>
+          </p:txBody>
+        </p:sp>
+        <p:sp>
+          <p:nvSpPr>
+            <p:cNvPr id="29" name="TextBox 28"/>
+            <p:cNvSpPr txBox="1"/>
+            <p:nvPr/>
+          </p:nvSpPr>
+          <p:spPr>
+            <a:xfrm>
+              <a:off x="4114800" y="2539900"/>
+              <a:ext cx="914400" cy="246221"/>
+            </a:xfrm>
+            <a:prstGeom prst="rect">
+              <a:avLst/>
+            </a:prstGeom>
+            <a:noFill/>
+          </p:spPr>
+          <p:txBody>
+            <a:bodyPr wrap="square" rtlCol="0">
+              <a:spAutoFit/>
+            </a:bodyPr>
+            <a:lstStyle/>
+            <a:p>
+              <a:pPr algn="ctr"/>
+              <a:r>
+                <a:rPr lang="en-US" sz="1000" dirty="0" smtClean="0">
+                  <a:latin typeface="Arial" panose="020B0604020202020204" pitchFamily="34" charset="0"/>
+                  <a:cs typeface="Arial" panose="020B0604020202020204" pitchFamily="34" charset="0"/>
+                </a:rPr>
+                <a:t>GPORCA</a:t>
+              </a:r>
+              <a:endParaRPr lang="en-US" sz="1000" dirty="0">
+                <a:latin typeface="Arial" panose="020B0604020202020204" pitchFamily="34" charset="0"/>
+                <a:cs typeface="Arial" panose="020B0604020202020204" pitchFamily="34" charset="0"/>
+              </a:endParaRPr>
+            </a:p>
+          </p:txBody>
+        </p:sp>
+      </p:grpSp>
+      <p:sp>
+        <p:nvSpPr>
+          <p:cNvPr id="30" name="TextBox 29"/>
+          <p:cNvSpPr txBox="1"/>
+          <p:nvPr/>
+        </p:nvSpPr>
+        <p:spPr>
+          <a:xfrm>
+            <a:off x="5675572" y="2392418"/>
+            <a:ext cx="914400" cy="553998"/>
+          </a:xfrm>
+          <a:prstGeom prst="rect">
+            <a:avLst/>
+          </a:prstGeom>
+          <a:noFill/>
+        </p:spPr>
+        <p:txBody>
+          <a:bodyPr wrap="square" rtlCol="0">
+            <a:spAutoFit/>
+          </a:bodyPr>
+          <a:lstStyle/>
+          <a:p>
+            <a:pPr algn="ctr"/>
+            <a:r>
+              <a:rPr lang="en-US" sz="1000" dirty="0" smtClean="0">
+                <a:latin typeface="Arial" panose="020B0604020202020204" pitchFamily="34" charset="0"/>
+                <a:cs typeface="Arial" panose="020B0604020202020204" pitchFamily="34" charset="0"/>
+              </a:rPr>
+              <a:t>Query Execution Plan</a:t>
+            </a:r>
+            <a:endParaRPr lang="en-US" sz="1000" dirty="0">
+              <a:latin typeface="Arial" panose="020B0604020202020204" pitchFamily="34" charset="0"/>
+              <a:cs typeface="Arial" panose="020B0604020202020204" pitchFamily="34" charset="0"/>
+            </a:endParaRPr>
+          </a:p>
+        </p:txBody>
+      </p:sp>
+      <p:cxnSp>
+        <p:nvCxnSpPr>
+          <p:cNvPr id="33" name="Straight Arrow Connector 32"/>
+          <p:cNvCxnSpPr>
+            <a:endCxn id="4" idx="1"/>
+          </p:cNvCxnSpPr>
+          <p:nvPr/>
+        </p:nvCxnSpPr>
+        <p:spPr>
+          <a:xfrm>
+            <a:off x="1401188" y="2959647"/>
+            <a:ext cx="610079" cy="1"/>
+          </a:xfrm>
+          <a:prstGeom prst="straightConnector1">
+            <a:avLst/>
+          </a:prstGeom>
+          <a:ln>
+            <a:solidFill>
+              <a:schemeClr val="tx1"/>
+            </a:solidFill>
+            <a:tailEnd type="triangle"/>
+          </a:ln>
+        </p:spPr>
+        <p:style>
+          <a:lnRef idx="1">
+            <a:schemeClr val="accent1"/>
+          </a:lnRef>
+          <a:fillRef idx="0">
+            <a:schemeClr val="accent1"/>
+          </a:fillRef>
+          <a:effectRef idx="0">
+            <a:schemeClr val="accent1"/>
+          </a:effectRef>
+          <a:fontRef idx="minor">
+            <a:schemeClr val="tx1"/>
+          </a:fontRef>
+        </p:style>
+      </p:cxnSp>
+      <p:grpSp>
+        <p:nvGrpSpPr>
+          <p:cNvPr id="2" name="Group 1"/>
+          <p:cNvGrpSpPr/>
+          <p:nvPr/>
+        </p:nvGrpSpPr>
+        <p:grpSpPr>
+          <a:xfrm>
+            <a:off x="4342102" y="3440574"/>
+            <a:ext cx="914400" cy="690340"/>
+            <a:chOff x="3733800" y="3070394"/>
+            <a:chExt cx="914400" cy="690340"/>
+          </a:xfrm>
+        </p:grpSpPr>
+        <p:sp>
+          <p:nvSpPr>
+            <p:cNvPr id="32" name="TextBox 31"/>
+            <p:cNvSpPr txBox="1"/>
+            <p:nvPr/>
+          </p:nvSpPr>
+          <p:spPr>
+            <a:xfrm>
+              <a:off x="3733800" y="3200121"/>
+              <a:ext cx="914400" cy="400110"/>
+            </a:xfrm>
+            <a:prstGeom prst="rect">
+              <a:avLst/>
+            </a:prstGeom>
+            <a:noFill/>
+          </p:spPr>
+          <p:txBody>
+            <a:bodyPr wrap="square" rtlCol="0">
+              <a:spAutoFit/>
+            </a:bodyPr>
+            <a:lstStyle/>
+            <a:p>
+              <a:pPr algn="ctr"/>
+              <a:r>
+                <a:rPr lang="en-US" sz="1000" dirty="0" smtClean="0">
+                  <a:latin typeface="Arial" panose="020B0604020202020204" pitchFamily="34" charset="0"/>
+                  <a:cs typeface="Arial" panose="020B0604020202020204" pitchFamily="34" charset="0"/>
+                </a:rPr>
+                <a:t>Legacy Optimizer</a:t>
+              </a:r>
+              <a:endParaRPr lang="en-US" sz="1000" dirty="0">
+                <a:latin typeface="Arial" panose="020B0604020202020204" pitchFamily="34" charset="0"/>
+                <a:cs typeface="Arial" panose="020B0604020202020204" pitchFamily="34" charset="0"/>
+              </a:endParaRPr>
+            </a:p>
+          </p:txBody>
+        </p:sp>
+        <p:sp>
+          <p:nvSpPr>
+            <p:cNvPr id="36" name="Rounded Rectangle 35"/>
+            <p:cNvSpPr/>
+            <p:nvPr/>
+          </p:nvSpPr>
+          <p:spPr>
+            <a:xfrm>
+              <a:off x="3733800" y="3070394"/>
+              <a:ext cx="914400" cy="690340"/>
+            </a:xfrm>
+            <a:prstGeom prst="roundRect">
+              <a:avLst/>
+            </a:prstGeom>
+            <a:noFill/>
+            <a:ln w="19050">
+              <a:solidFill>
+                <a:schemeClr val="tx1"/>
+              </a:solidFill>
+            </a:ln>
+          </p:spPr>
+          <p:style>
+            <a:lnRef idx="2">
+              <a:schemeClr val="accent1">
+                <a:shade val="50000"/>
+              </a:schemeClr>
+            </a:lnRef>
+            <a:fillRef idx="1">
+              <a:schemeClr val="accent1"/>
+            </a:fillRef>
+            <a:effectRef idx="0">
+              <a:schemeClr val="accent1"/>
+            </a:effectRef>
+            <a:fontRef idx="minor">
+              <a:schemeClr val="lt1"/>
+            </a:fontRef>
+          </p:style>
+          <p:txBody>
+            <a:bodyPr rtlCol="0" anchor="ctr"/>
+            <a:lstStyle/>
+            <a:p>
+              <a:pPr algn="ctr"/>
+              <a:endParaRPr lang="en-US" sz="1000"/>
+            </a:p>
+          </p:txBody>
+        </p:sp>
+      </p:grpSp>
+      <p:grpSp>
+        <p:nvGrpSpPr>
+          <p:cNvPr id="48" name="Group 47"/>
+          <p:cNvGrpSpPr/>
+          <p:nvPr/>
+        </p:nvGrpSpPr>
+        <p:grpSpPr>
+          <a:xfrm>
+            <a:off x="6503212" y="2638105"/>
+            <a:ext cx="854189" cy="638495"/>
+            <a:chOff x="6449367" y="2345789"/>
+            <a:chExt cx="914400" cy="690340"/>
+          </a:xfrm>
+        </p:grpSpPr>
+        <p:sp>
+          <p:nvSpPr>
+            <p:cNvPr id="31" name="TextBox 30"/>
+            <p:cNvSpPr txBox="1"/>
+            <p:nvPr/>
+          </p:nvSpPr>
+          <p:spPr>
+            <a:xfrm>
+              <a:off x="6449367" y="2475516"/>
+              <a:ext cx="914400" cy="400109"/>
+            </a:xfrm>
+            <a:prstGeom prst="rect">
+              <a:avLst/>
+            </a:prstGeom>
+            <a:noFill/>
+          </p:spPr>
+          <p:txBody>
+            <a:bodyPr wrap="square" rtlCol="0">
+              <a:spAutoFit/>
+            </a:bodyPr>
+            <a:lstStyle/>
+            <a:p>
+              <a:pPr algn="ctr"/>
+              <a:r>
+                <a:rPr lang="en-US" sz="1000" dirty="0" smtClean="0">
+                  <a:latin typeface="Arial" panose="020B0604020202020204" pitchFamily="34" charset="0"/>
+                  <a:cs typeface="Arial" panose="020B0604020202020204" pitchFamily="34" charset="0"/>
+                </a:rPr>
+                <a:t>Execution Engine</a:t>
+              </a:r>
+              <a:endParaRPr lang="en-US" sz="1000" dirty="0">
+                <a:latin typeface="Arial" panose="020B0604020202020204" pitchFamily="34" charset="0"/>
+                <a:cs typeface="Arial" panose="020B0604020202020204" pitchFamily="34" charset="0"/>
+              </a:endParaRPr>
+            </a:p>
+          </p:txBody>
+        </p:sp>
+        <p:sp>
+          <p:nvSpPr>
+            <p:cNvPr id="38" name="Rounded Rectangle 37"/>
+            <p:cNvSpPr/>
+            <p:nvPr/>
+          </p:nvSpPr>
+          <p:spPr>
+            <a:xfrm>
+              <a:off x="6449367" y="2345789"/>
+              <a:ext cx="914400" cy="690340"/>
+            </a:xfrm>
+            <a:prstGeom prst="roundRect">
+              <a:avLst/>
+            </a:prstGeom>
+            <a:noFill/>
+            <a:ln w="19050">
+              <a:solidFill>
+                <a:schemeClr val="tx1"/>
+              </a:solidFill>
+            </a:ln>
+          </p:spPr>
+          <p:style>
+            <a:lnRef idx="2">
+              <a:schemeClr val="accent1">
+                <a:shade val="50000"/>
+              </a:schemeClr>
+            </a:lnRef>
+            <a:fillRef idx="1">
+              <a:schemeClr val="accent1"/>
+            </a:fillRef>
+            <a:effectRef idx="0">
+              <a:schemeClr val="accent1"/>
+            </a:effectRef>
+            <a:fontRef idx="minor">
+              <a:schemeClr val="lt1"/>
+            </a:fontRef>
+          </p:style>
+          <p:txBody>
+            <a:bodyPr rtlCol="0" anchor="ctr"/>
+            <a:lstStyle/>
+            <a:p>
+              <a:pPr algn="ctr"/>
+              <a:endParaRPr lang="en-US" sz="1000"/>
+            </a:p>
+          </p:txBody>
+        </p:sp>
+      </p:grpSp>
+      <p:cxnSp>
+        <p:nvCxnSpPr>
+          <p:cNvPr id="40" name="Elbow Connector 39"/>
+          <p:cNvCxnSpPr/>
+          <p:nvPr/>
+        </p:nvCxnSpPr>
+        <p:spPr>
+          <a:xfrm rot="5400000" flipH="1" flipV="1">
+            <a:off x="4981254" y="3264816"/>
+            <a:ext cx="788340" cy="221814"/>
+          </a:xfrm>
+          <a:prstGeom prst="bentConnector3">
+            <a:avLst>
+              <a:gd name="adj1" fmla="val 597"/>
+            </a:avLst>
+          </a:prstGeom>
+          <a:ln>
+            <a:solidFill>
+              <a:schemeClr val="tx1"/>
+            </a:solidFill>
+            <a:tailEnd type="triangle"/>
+          </a:ln>
+        </p:spPr>
+        <p:style>
+          <a:lnRef idx="1">
+            <a:schemeClr val="accent1"/>
+          </a:lnRef>
+          <a:fillRef idx="0">
+            <a:schemeClr val="accent1"/>
+          </a:fillRef>
+          <a:effectRef idx="0">
+            <a:schemeClr val="accent1"/>
+          </a:effectRef>
+          <a:fontRef idx="minor">
+            <a:schemeClr val="tx1"/>
+          </a:fontRef>
+        </p:style>
+      </p:cxnSp>
+      <p:sp>
+        <p:nvSpPr>
+          <p:cNvPr id="3" name="Rectangle 2"/>
+          <p:cNvSpPr/>
+          <p:nvPr/>
+        </p:nvSpPr>
+        <p:spPr>
+          <a:xfrm rot="2700000">
+            <a:off x="4723102" y="2894076"/>
+            <a:ext cx="152400" cy="155448"/>
+          </a:xfrm>
+          <a:prstGeom prst="rect">
+            <a:avLst/>
+          </a:prstGeom>
+          <a:solidFill>
+            <a:schemeClr val="bg1">
+              <a:lumMod val="75000"/>
+            </a:schemeClr>
+          </a:solidFill>
+          <a:ln w="12700">
+            <a:solidFill>
+              <a:schemeClr val="tx1">
+                <a:lumMod val="65000"/>
+                <a:lumOff val="35000"/>
+              </a:schemeClr>
+            </a:solidFill>
+          </a:ln>
+        </p:spPr>
+        <p:style>
+          <a:lnRef idx="2">
+            <a:schemeClr val="accent1">
+              <a:shade val="50000"/>
+            </a:schemeClr>
+          </a:lnRef>
+          <a:fillRef idx="1">
+            <a:schemeClr val="accent1"/>
+          </a:fillRef>
+          <a:effectRef idx="0">
+            <a:schemeClr val="accent1"/>
+          </a:effectRef>
+          <a:fontRef idx="minor">
+            <a:schemeClr val="lt1"/>
+          </a:fontRef>
+        </p:style>
+        <p:txBody>
+          <a:bodyPr rtlCol="0" anchor="ctr"/>
+          <a:lstStyle/>
+          <a:p>
+            <a:pPr algn="ctr"/>
+            <a:endParaRPr lang="en-US"/>
+          </a:p>
+        </p:txBody>
+      </p:sp>
+      <p:cxnSp>
+        <p:nvCxnSpPr>
+          <p:cNvPr id="24" name="Straight Arrow Connector 23"/>
+          <p:cNvCxnSpPr/>
+          <p:nvPr/>
+        </p:nvCxnSpPr>
+        <p:spPr>
+          <a:xfrm>
+            <a:off x="4799302" y="2621171"/>
+            <a:ext cx="0" cy="248260"/>
+          </a:xfrm>
+          <a:prstGeom prst="straightConnector1">
+            <a:avLst/>
+          </a:prstGeom>
+          <a:ln>
+            <a:solidFill>
+              <a:schemeClr val="tx1"/>
+            </a:solidFill>
+            <a:tailEnd type="triangle"/>
+          </a:ln>
+        </p:spPr>
+        <p:style>
+          <a:lnRef idx="1">
+            <a:schemeClr val="accent1"/>
+          </a:lnRef>
+          <a:fillRef idx="0">
+            <a:schemeClr val="accent1"/>
+          </a:fillRef>
+          <a:effectRef idx="0">
+            <a:schemeClr val="accent1"/>
+          </a:effectRef>
+          <a:fontRef idx="minor">
+            <a:schemeClr val="tx1"/>
+          </a:fontRef>
+        </p:style>
+      </p:cxnSp>
+      <p:cxnSp>
+        <p:nvCxnSpPr>
+          <p:cNvPr id="34" name="Straight Arrow Connector 33"/>
+          <p:cNvCxnSpPr/>
+          <p:nvPr/>
+        </p:nvCxnSpPr>
+        <p:spPr>
+          <a:xfrm flipH="1">
+            <a:off x="4798733" y="3090806"/>
+            <a:ext cx="1139" cy="340314"/>
+          </a:xfrm>
+          <a:prstGeom prst="straightConnector1">
+            <a:avLst/>
+          </a:prstGeom>
+          <a:ln>
+            <a:solidFill>
+              <a:schemeClr val="tx1"/>
+            </a:solidFill>
+            <a:tailEnd type="triangle"/>
+          </a:ln>
+        </p:spPr>
+        <p:style>
+          <a:lnRef idx="1">
+            <a:schemeClr val="accent1"/>
+          </a:lnRef>
+          <a:fillRef idx="0">
+            <a:schemeClr val="accent1"/>
+          </a:fillRef>
+          <a:effectRef idx="0">
+            <a:schemeClr val="accent1"/>
+          </a:effectRef>
+          <a:fontRef idx="minor">
+            <a:schemeClr val="tx1"/>
+          </a:fontRef>
+        </p:style>
+      </p:cxnSp>
+      <p:cxnSp>
+        <p:nvCxnSpPr>
+          <p:cNvPr id="39" name="Elbow Connector 38"/>
+          <p:cNvCxnSpPr>
+            <a:endCxn id="6" idx="1"/>
+          </p:cNvCxnSpPr>
+          <p:nvPr/>
+        </p:nvCxnSpPr>
+        <p:spPr>
+          <a:xfrm flipV="1">
+            <a:off x="3252948" y="2284696"/>
+            <a:ext cx="1089154" cy="696858"/>
+          </a:xfrm>
+          <a:prstGeom prst="bentConnector3">
+            <a:avLst>
+              <a:gd name="adj1" fmla="val 249"/>
+            </a:avLst>
+          </a:prstGeom>
+          <a:ln>
+            <a:solidFill>
+              <a:schemeClr val="tx1"/>
+            </a:solidFill>
+            <a:tailEnd type="triangle"/>
+          </a:ln>
+        </p:spPr>
+        <p:style>
+          <a:lnRef idx="1">
+            <a:schemeClr val="accent1"/>
+          </a:lnRef>
+          <a:fillRef idx="0">
+            <a:schemeClr val="accent1"/>
+          </a:fillRef>
+          <a:effectRef idx="0">
+            <a:schemeClr val="accent1"/>
+          </a:effectRef>
+          <a:fontRef idx="minor">
+            <a:schemeClr val="tx1"/>
+          </a:fontRef>
+        </p:style>
+      </p:cxnSp>
+      <p:sp>
+        <p:nvSpPr>
+          <p:cNvPr id="52" name="TextBox 51"/>
+          <p:cNvSpPr txBox="1"/>
+          <p:nvPr/>
+        </p:nvSpPr>
+        <p:spPr>
+          <a:xfrm>
+            <a:off x="3252948" y="1988189"/>
+            <a:ext cx="1041101" cy="246221"/>
+          </a:xfrm>
+          <a:prstGeom prst="rect">
+            <a:avLst/>
+          </a:prstGeom>
+          <a:noFill/>
+        </p:spPr>
+        <p:txBody>
+          <a:bodyPr wrap="square" rtlCol="0">
+            <a:spAutoFit/>
+          </a:bodyPr>
+          <a:lstStyle/>
+          <a:p>
+            <a:pPr algn="ctr"/>
+            <a:r>
+              <a:rPr lang="en-US" sz="1000" dirty="0" smtClean="0">
+                <a:latin typeface="Arial" panose="020B0604020202020204" pitchFamily="34" charset="0"/>
+                <a:cs typeface="Arial" panose="020B0604020202020204" pitchFamily="34" charset="0"/>
+              </a:rPr>
+              <a:t>optimizer = on</a:t>
+            </a:r>
+            <a:endParaRPr lang="en-US" sz="1000" dirty="0">
+              <a:latin typeface="Arial" panose="020B0604020202020204" pitchFamily="34" charset="0"/>
+              <a:cs typeface="Arial" panose="020B0604020202020204" pitchFamily="34" charset="0"/>
+            </a:endParaRPr>
+          </a:p>
+        </p:txBody>
+      </p:sp>
+      <p:sp>
+        <p:nvSpPr>
+          <p:cNvPr id="54" name="TextBox 53"/>
+          <p:cNvSpPr txBox="1"/>
+          <p:nvPr/>
+        </p:nvSpPr>
+        <p:spPr>
+          <a:xfrm>
+            <a:off x="3252948" y="3524356"/>
+            <a:ext cx="1041101" cy="246221"/>
+          </a:xfrm>
+          <a:prstGeom prst="rect">
+            <a:avLst/>
+          </a:prstGeom>
+          <a:noFill/>
+        </p:spPr>
+        <p:txBody>
+          <a:bodyPr wrap="square" rtlCol="0">
+            <a:spAutoFit/>
+          </a:bodyPr>
+          <a:lstStyle/>
+          <a:p>
+            <a:pPr algn="ctr"/>
+            <a:r>
+              <a:rPr lang="en-US" sz="1000" dirty="0">
+                <a:latin typeface="Arial" panose="020B0604020202020204" pitchFamily="34" charset="0"/>
+                <a:cs typeface="Arial" panose="020B0604020202020204" pitchFamily="34" charset="0"/>
+              </a:rPr>
+              <a:t>o</a:t>
+            </a:r>
+            <a:r>
+              <a:rPr lang="en-US" sz="1000" dirty="0" smtClean="0">
+                <a:latin typeface="Arial" panose="020B0604020202020204" pitchFamily="34" charset="0"/>
+                <a:cs typeface="Arial" panose="020B0604020202020204" pitchFamily="34" charset="0"/>
+              </a:rPr>
+              <a:t>ptimizer = off</a:t>
+            </a:r>
+            <a:endParaRPr lang="en-US" sz="1000" dirty="0">
+              <a:latin typeface="Arial" panose="020B0604020202020204" pitchFamily="34" charset="0"/>
+              <a:cs typeface="Arial" panose="020B0604020202020204" pitchFamily="34" charset="0"/>
+            </a:endParaRPr>
+          </a:p>
+        </p:txBody>
+      </p:sp>
+      <p:sp>
+        <p:nvSpPr>
+          <p:cNvPr id="69" name="TextBox 68"/>
+          <p:cNvSpPr txBox="1"/>
+          <p:nvPr/>
+        </p:nvSpPr>
+        <p:spPr>
+          <a:xfrm>
+            <a:off x="4027432" y="2847199"/>
+            <a:ext cx="692839" cy="246221"/>
+          </a:xfrm>
+          <a:prstGeom prst="rect">
+            <a:avLst/>
+          </a:prstGeom>
+          <a:noFill/>
+        </p:spPr>
+        <p:txBody>
+          <a:bodyPr wrap="square" rtlCol="0">
+            <a:spAutoFit/>
+          </a:bodyPr>
+          <a:lstStyle/>
+          <a:p>
+            <a:pPr algn="ctr"/>
+            <a:r>
+              <a:rPr lang="en-US" sz="1000" dirty="0" smtClean="0">
+                <a:latin typeface="Arial" panose="020B0604020202020204" pitchFamily="34" charset="0"/>
+                <a:cs typeface="Arial" panose="020B0604020202020204" pitchFamily="34" charset="0"/>
+              </a:rPr>
+              <a:t>fallback</a:t>
+            </a:r>
+            <a:endParaRPr lang="en-US" sz="1000" dirty="0">
+              <a:latin typeface="Arial" panose="020B0604020202020204" pitchFamily="34" charset="0"/>
+              <a:cs typeface="Arial" panose="020B0604020202020204" pitchFamily="34" charset="0"/>
+            </a:endParaRPr>
+          </a:p>
+        </p:txBody>
+      </p:sp>
+      <p:sp>
+        <p:nvSpPr>
+          <p:cNvPr id="96" name="TextBox 95"/>
+          <p:cNvSpPr txBox="1"/>
+          <p:nvPr/>
+        </p:nvSpPr>
+        <p:spPr>
+          <a:xfrm>
+            <a:off x="3560643" y="1527004"/>
+            <a:ext cx="1676400" cy="246221"/>
+          </a:xfrm>
+          <a:prstGeom prst="rect">
+            <a:avLst/>
+          </a:prstGeom>
+          <a:noFill/>
+        </p:spPr>
+        <p:txBody>
+          <a:bodyPr wrap="square" rtlCol="0">
+            <a:spAutoFit/>
+          </a:bodyPr>
+          <a:lstStyle/>
+          <a:p>
+            <a:pPr algn="ctr"/>
+            <a:r>
+              <a:rPr lang="en-US" sz="1000" dirty="0" smtClean="0">
+                <a:latin typeface="Arial" panose="020B0604020202020204" pitchFamily="34" charset="0"/>
+                <a:cs typeface="Arial" panose="020B0604020202020204" pitchFamily="34" charset="0"/>
+              </a:rPr>
+              <a:t>Query Plan Generation</a:t>
+            </a:r>
+            <a:endParaRPr lang="en-US" sz="1000" dirty="0">
+              <a:latin typeface="Arial" panose="020B0604020202020204" pitchFamily="34" charset="0"/>
+              <a:cs typeface="Arial" panose="020B0604020202020204" pitchFamily="34" charset="0"/>
+            </a:endParaRPr>
+          </a:p>
+        </p:txBody>
+      </p:sp>
+      <p:sp>
+        <p:nvSpPr>
+          <p:cNvPr id="97" name="Rectangle 96"/>
+          <p:cNvSpPr/>
+          <p:nvPr/>
+        </p:nvSpPr>
+        <p:spPr>
+          <a:xfrm>
+            <a:off x="3025577" y="1806552"/>
+            <a:ext cx="2689423" cy="2418316"/>
+          </a:xfrm>
+          <a:prstGeom prst="rect">
+            <a:avLst/>
+          </a:prstGeom>
+          <a:noFill/>
+          <a:ln w="19050">
+            <a:solidFill>
+              <a:schemeClr val="tx1"/>
+            </a:solidFill>
+          </a:ln>
+        </p:spPr>
+        <p:style>
+          <a:lnRef idx="2">
+            <a:schemeClr val="accent1">
+              <a:shade val="50000"/>
+            </a:schemeClr>
+          </a:lnRef>
+          <a:fillRef idx="1">
+            <a:schemeClr val="accent1"/>
+          </a:fillRef>
+          <a:effectRef idx="0">
+            <a:schemeClr val="accent1"/>
+          </a:effectRef>
+          <a:fontRef idx="minor">
+            <a:schemeClr val="lt1"/>
+          </a:fontRef>
+        </p:style>
+        <p:txBody>
+          <a:bodyPr rtlCol="0" anchor="ctr"/>
+          <a:lstStyle/>
+          <a:p>
+            <a:pPr algn="ctr"/>
+            <a:endParaRPr lang="en-US"/>
+          </a:p>
+        </p:txBody>
+      </p:sp>
+    </p:spTree>
+    <p:extLst>
+      <p:ext uri="{BB962C8B-B14F-4D97-AF65-F5344CB8AC3E}">
+        <p14:creationId xmlns:p14="http://schemas.microsoft.com/office/powerpoint/2010/main" val="482992060"/>
+      </p:ext>
+    </p:extLst>
+  </p:cSld>
+  <p:clrMapOvr>
+    <a:masterClrMapping/>
+  </p:clrMapOvr>
+  <p:timing>
+    <p:tnLst>
+      <p:par>
+        <p:cTn id="1" dur="indefinite" restart="never" nodeType="tmRoot"/>
+      </p:par>
+    </p:tnLst>
+  </p:timing>
+</p:sld>
+</file>
+
+<file path=ppt/slides/slide2.xml><?xml version="1.0" encoding="utf-8"?>
 <p:sld xmlns:a="http://schemas.openxmlformats.org/drawingml/2006/main" xmlns:r="http://schemas.openxmlformats.org/officeDocument/2006/relationships" xmlns:p="http://schemas.openxmlformats.org/presentationml/2006/main">
   <p:cSld>
     <p:spTree>
@@ -4074,4 +5700,265 @@
   <a:objectDefaults/>
   <a:extraClrSchemeLst/>
 </a:theme>
+</file>
+
+<file path=ppt/theme/theme2.xml><?xml version="1.0" encoding="utf-8"?>
+<a:theme xmlns:a="http://schemas.openxmlformats.org/drawingml/2006/main" name="Office Theme">
+  <a:themeElements>
+    <a:clrScheme name="Office">
+      <a:dk1>
+        <a:sysClr val="windowText" lastClr="000000"/>
+      </a:dk1>
+      <a:lt1>
+        <a:sysClr val="window" lastClr="FFFFFF"/>
+      </a:lt1>
+      <a:dk2>
+        <a:srgbClr val="44546A"/>
+      </a:dk2>
+      <a:lt2>
+        <a:srgbClr val="E7E6E6"/>
+      </a:lt2>
+      <a:accent1>
+        <a:srgbClr val="5B9BD5"/>
+      </a:accent1>
+      <a:accent2>
+        <a:srgbClr val="ED7D31"/>
+      </a:accent2>
+      <a:accent3>
+        <a:srgbClr val="A5A5A5"/>
+      </a:accent3>
+      <a:accent4>
+        <a:srgbClr val="FFC000"/>
+      </a:accent4>
+      <a:accent5>
+        <a:srgbClr val="4472C4"/>
+      </a:accent5>
+      <a:accent6>
+        <a:srgbClr val="70AD47"/>
+      </a:accent6>
+      <a:hlink>
+        <a:srgbClr val="0563C1"/>
+      </a:hlink>
+      <a:folHlink>
+        <a:srgbClr val="954F72"/>
+      </a:folHlink>
+    </a:clrScheme>
+    <a:fontScheme name="Office">
+      <a:majorFont>
+        <a:latin typeface="Calibri Light" panose="020F0302020204030204"/>
+        <a:ea typeface=""/>
+        <a:cs typeface=""/>
+        <a:font script="Jpan" typeface="ＭＳ Ｐゴシック"/>
+        <a:font script="Hang" typeface="맑은 고딕"/>
+        <a:font script="Hans" typeface="宋体"/>
+        <a:font script="Hant" typeface="新細明體"/>
+        <a:font script="Arab" typeface="Times New Roman"/>
+        <a:font script="Hebr" typeface="Times New Roman"/>
+        <a:font script="Thai" typeface="Angsana New"/>
+        <a:font script="Ethi" typeface="Nyala"/>
+        <a:font script="Beng" typeface="Vrinda"/>
+        <a:font script="Gujr" typeface="Shruti"/>
+        <a:font script="Khmr" typeface="MoolBoran"/>
+        <a:font script="Knda" typeface="Tunga"/>
+        <a:font script="Guru" typeface="Raavi"/>
+        <a:font script="Cans" typeface="Euphemia"/>
+        <a:font script="Cher" typeface="Plantagenet Cherokee"/>
+        <a:font script="Yiii" typeface="Microsoft Yi Baiti"/>
+        <a:font script="Tibt" typeface="Microsoft Himalaya"/>
+        <a:font script="Thaa" typeface="MV Boli"/>
+        <a:font script="Deva" typeface="Mangal"/>
+        <a:font script="Telu" typeface="Gautami"/>
+        <a:font script="Taml" typeface="Latha"/>
+        <a:font script="Syrc" typeface="Estrangelo Edessa"/>
+        <a:font script="Orya" typeface="Kalinga"/>
+        <a:font script="Mlym" typeface="Kartika"/>
+        <a:font script="Laoo" typeface="DokChampa"/>
+        <a:font script="Sinh" typeface="Iskoola Pota"/>
+        <a:font script="Mong" typeface="Mongolian Baiti"/>
+        <a:font script="Viet" typeface="Times New Roman"/>
+        <a:font script="Uigh" typeface="Microsoft Uighur"/>
+        <a:font script="Geor" typeface="Sylfaen"/>
+      </a:majorFont>
+      <a:minorFont>
+        <a:latin typeface="Calibri" panose="020F0502020204030204"/>
+        <a:ea typeface=""/>
+        <a:cs typeface=""/>
+        <a:font script="Jpan" typeface="ＭＳ Ｐゴシック"/>
+        <a:font script="Hang" typeface="맑은 고딕"/>
+        <a:font script="Hans" typeface="宋体"/>
+        <a:font script="Hant" typeface="新細明體"/>
+        <a:font script="Arab" typeface="Arial"/>
+        <a:font script="Hebr" typeface="Arial"/>
+        <a:font script="Thai" typeface="Cordia New"/>
+        <a:font script="Ethi" typeface="Nyala"/>
+        <a:font script="Beng" typeface="Vrinda"/>
+        <a:font script="Gujr" typeface="Shruti"/>
+        <a:font script="Khmr" typeface="DaunPenh"/>
+        <a:font script="Knda" typeface="Tunga"/>
+        <a:font script="Guru" typeface="Raavi"/>
+        <a:font script="Cans" typeface="Euphemia"/>
+        <a:font script="Cher" typeface="Plantagenet Cherokee"/>
+        <a:font script="Yiii" typeface="Microsoft Yi Baiti"/>
+        <a:font script="Tibt" typeface="Microsoft Himalaya"/>
+        <a:font script="Thaa" typeface="MV Boli"/>
+        <a:font script="Deva" typeface="Mangal"/>
+        <a:font script="Telu" typeface="Gautami"/>
+        <a:font script="Taml" typeface="Latha"/>
+        <a:font script="Syrc" typeface="Estrangelo Edessa"/>
+        <a:font script="Orya" typeface="Kalinga"/>
+        <a:font script="Mlym" typeface="Kartika"/>
+        <a:font script="Laoo" typeface="DokChampa"/>
+        <a:font script="Sinh" typeface="Iskoola Pota"/>
+        <a:font script="Mong" typeface="Mongolian Baiti"/>
+        <a:font script="Viet" typeface="Arial"/>
+        <a:font script="Uigh" typeface="Microsoft Uighur"/>
+        <a:font script="Geor" typeface="Sylfaen"/>
+      </a:minorFont>
+    </a:fontScheme>
+    <a:fmtScheme name="Office">
+      <a:fillStyleLst>
+        <a:solidFill>
+          <a:schemeClr val="phClr"/>
+        </a:solidFill>
+        <a:gradFill rotWithShape="1">
+          <a:gsLst>
+            <a:gs pos="0">
+              <a:schemeClr val="phClr">
+                <a:lumMod val="110000"/>
+                <a:satMod val="105000"/>
+                <a:tint val="67000"/>
+              </a:schemeClr>
+            </a:gs>
+            <a:gs pos="50000">
+              <a:schemeClr val="phClr">
+                <a:lumMod val="105000"/>
+                <a:satMod val="103000"/>
+                <a:tint val="73000"/>
+              </a:schemeClr>
+            </a:gs>
+            <a:gs pos="100000">
+              <a:schemeClr val="phClr">
+                <a:lumMod val="105000"/>
+                <a:satMod val="109000"/>
+                <a:tint val="81000"/>
+              </a:schemeClr>
+            </a:gs>
+          </a:gsLst>
+          <a:lin ang="5400000" scaled="0"/>
+        </a:gradFill>
+        <a:gradFill rotWithShape="1">
+          <a:gsLst>
+            <a:gs pos="0">
+              <a:schemeClr val="phClr">
+                <a:satMod val="103000"/>
+                <a:lumMod val="102000"/>
+                <a:tint val="94000"/>
+              </a:schemeClr>
+            </a:gs>
+            <a:gs pos="50000">
+              <a:schemeClr val="phClr">
+                <a:satMod val="110000"/>
+                <a:lumMod val="100000"/>
+                <a:shade val="100000"/>
+              </a:schemeClr>
+            </a:gs>
+            <a:gs pos="100000">
+              <a:schemeClr val="phClr">
+                <a:lumMod val="99000"/>
+                <a:satMod val="120000"/>
+                <a:shade val="78000"/>
+              </a:schemeClr>
+            </a:gs>
+          </a:gsLst>
+          <a:lin ang="5400000" scaled="0"/>
+        </a:gradFill>
+      </a:fillStyleLst>
+      <a:lnStyleLst>
+        <a:ln w="6350" cap="flat" cmpd="sng" algn="ctr">
+          <a:solidFill>
+            <a:schemeClr val="phClr"/>
+          </a:solidFill>
+          <a:prstDash val="solid"/>
+          <a:miter lim="800000"/>
+        </a:ln>
+        <a:ln w="12700" cap="flat" cmpd="sng" algn="ctr">
+          <a:solidFill>
+            <a:schemeClr val="phClr"/>
+          </a:solidFill>
+          <a:prstDash val="solid"/>
+          <a:miter lim="800000"/>
+        </a:ln>
+        <a:ln w="19050" cap="flat" cmpd="sng" algn="ctr">
+          <a:solidFill>
+            <a:schemeClr val="phClr"/>
+          </a:solidFill>
+          <a:prstDash val="solid"/>
+          <a:miter lim="800000"/>
+        </a:ln>
+      </a:lnStyleLst>
+      <a:effectStyleLst>
+        <a:effectStyle>
+          <a:effectLst/>
+        </a:effectStyle>
+        <a:effectStyle>
+          <a:effectLst/>
+        </a:effectStyle>
+        <a:effectStyle>
+          <a:effectLst>
+            <a:outerShdw blurRad="57150" dist="19050" dir="5400000" algn="ctr" rotWithShape="0">
+              <a:srgbClr val="000000">
+                <a:alpha val="63000"/>
+              </a:srgbClr>
+            </a:outerShdw>
+          </a:effectLst>
+        </a:effectStyle>
+      </a:effectStyleLst>
+      <a:bgFillStyleLst>
+        <a:solidFill>
+          <a:schemeClr val="phClr"/>
+        </a:solidFill>
+        <a:solidFill>
+          <a:schemeClr val="phClr">
+            <a:tint val="95000"/>
+            <a:satMod val="170000"/>
+          </a:schemeClr>
+        </a:solidFill>
+        <a:gradFill rotWithShape="1">
+          <a:gsLst>
+            <a:gs pos="0">
+              <a:schemeClr val="phClr">
+                <a:tint val="93000"/>
+                <a:satMod val="150000"/>
+                <a:shade val="98000"/>
+                <a:lumMod val="102000"/>
+              </a:schemeClr>
+            </a:gs>
+            <a:gs pos="50000">
+              <a:schemeClr val="phClr">
+                <a:tint val="98000"/>
+                <a:satMod val="130000"/>
+                <a:shade val="90000"/>
+                <a:lumMod val="103000"/>
+              </a:schemeClr>
+            </a:gs>
+            <a:gs pos="100000">
+              <a:schemeClr val="phClr">
+                <a:shade val="63000"/>
+                <a:satMod val="120000"/>
+              </a:schemeClr>
+            </a:gs>
+          </a:gsLst>
+          <a:lin ang="5400000" scaled="0"/>
+        </a:gradFill>
+      </a:bgFillStyleLst>
+    </a:fmtScheme>
+  </a:themeElements>
+  <a:objectDefaults/>
+  <a:extraClrSchemeLst/>
+  <a:extLst>
+    <a:ext uri="{05A4C25C-085E-4340-85A3-A5531E510DB2}">
+      <thm15:themeFamily xmlns:thm15="http://schemas.microsoft.com/office/thememl/2012/main" name="Office Theme" id="{62F939B6-93AF-4DB8-9C6B-D6C7DFDC589F}" vid="{4A3C46E8-61CC-4603-A589-7422A47A8E4A}"/>
+    </a:ext>
+  </a:extLst>
+</a:theme>
 </file>
</xml_diff>